<commit_message>
paper: minor rephrasings + add fig3
</commit_message>
<xml_diff>
--- a/paper/figures.pptx
+++ b/paper/figures.pptx
@@ -7,6 +7,7 @@
   <p:sldIdLst>
     <p:sldId id="257" r:id="rId2"/>
     <p:sldId id="256" r:id="rId3"/>
+    <p:sldId id="258" r:id="rId4"/>
   </p:sldIdLst>
   <p:sldSz cx="14400213" cy="7199313"/>
   <p:notesSz cx="6858000" cy="9144000"/>
@@ -244,7 +245,7 @@
           <a:p>
             <a:fld id="{A6CBF5DC-C104-4B52-94FE-792D1D730C2D}" type="datetimeFigureOut">
               <a:rPr lang="en-GB" smtClean="0"/>
-              <a:t>24/01/2021</a:t>
+              <a:t>29/01/2021</a:t>
             </a:fld>
             <a:endParaRPr lang="en-GB"/>
           </a:p>
@@ -414,7 +415,7 @@
           <a:p>
             <a:fld id="{A6CBF5DC-C104-4B52-94FE-792D1D730C2D}" type="datetimeFigureOut">
               <a:rPr lang="en-GB" smtClean="0"/>
-              <a:t>24/01/2021</a:t>
+              <a:t>29/01/2021</a:t>
             </a:fld>
             <a:endParaRPr lang="en-GB"/>
           </a:p>
@@ -594,7 +595,7 @@
           <a:p>
             <a:fld id="{A6CBF5DC-C104-4B52-94FE-792D1D730C2D}" type="datetimeFigureOut">
               <a:rPr lang="en-GB" smtClean="0"/>
-              <a:t>24/01/2021</a:t>
+              <a:t>29/01/2021</a:t>
             </a:fld>
             <a:endParaRPr lang="en-GB"/>
           </a:p>
@@ -764,7 +765,7 @@
           <a:p>
             <a:fld id="{A6CBF5DC-C104-4B52-94FE-792D1D730C2D}" type="datetimeFigureOut">
               <a:rPr lang="en-GB" smtClean="0"/>
-              <a:t>24/01/2021</a:t>
+              <a:t>29/01/2021</a:t>
             </a:fld>
             <a:endParaRPr lang="en-GB"/>
           </a:p>
@@ -1010,7 +1011,7 @@
           <a:p>
             <a:fld id="{A6CBF5DC-C104-4B52-94FE-792D1D730C2D}" type="datetimeFigureOut">
               <a:rPr lang="en-GB" smtClean="0"/>
-              <a:t>24/01/2021</a:t>
+              <a:t>29/01/2021</a:t>
             </a:fld>
             <a:endParaRPr lang="en-GB"/>
           </a:p>
@@ -1242,7 +1243,7 @@
           <a:p>
             <a:fld id="{A6CBF5DC-C104-4B52-94FE-792D1D730C2D}" type="datetimeFigureOut">
               <a:rPr lang="en-GB" smtClean="0"/>
-              <a:t>24/01/2021</a:t>
+              <a:t>29/01/2021</a:t>
             </a:fld>
             <a:endParaRPr lang="en-GB"/>
           </a:p>
@@ -1609,7 +1610,7 @@
           <a:p>
             <a:fld id="{A6CBF5DC-C104-4B52-94FE-792D1D730C2D}" type="datetimeFigureOut">
               <a:rPr lang="en-GB" smtClean="0"/>
-              <a:t>24/01/2021</a:t>
+              <a:t>29/01/2021</a:t>
             </a:fld>
             <a:endParaRPr lang="en-GB"/>
           </a:p>
@@ -1727,7 +1728,7 @@
           <a:p>
             <a:fld id="{A6CBF5DC-C104-4B52-94FE-792D1D730C2D}" type="datetimeFigureOut">
               <a:rPr lang="en-GB" smtClean="0"/>
-              <a:t>24/01/2021</a:t>
+              <a:t>29/01/2021</a:t>
             </a:fld>
             <a:endParaRPr lang="en-GB"/>
           </a:p>
@@ -1822,7 +1823,7 @@
           <a:p>
             <a:fld id="{A6CBF5DC-C104-4B52-94FE-792D1D730C2D}" type="datetimeFigureOut">
               <a:rPr lang="en-GB" smtClean="0"/>
-              <a:t>24/01/2021</a:t>
+              <a:t>29/01/2021</a:t>
             </a:fld>
             <a:endParaRPr lang="en-GB"/>
           </a:p>
@@ -2099,7 +2100,7 @@
           <a:p>
             <a:fld id="{A6CBF5DC-C104-4B52-94FE-792D1D730C2D}" type="datetimeFigureOut">
               <a:rPr lang="en-GB" smtClean="0"/>
-              <a:t>24/01/2021</a:t>
+              <a:t>29/01/2021</a:t>
             </a:fld>
             <a:endParaRPr lang="en-GB"/>
           </a:p>
@@ -2356,7 +2357,7 @@
           <a:p>
             <a:fld id="{A6CBF5DC-C104-4B52-94FE-792D1D730C2D}" type="datetimeFigureOut">
               <a:rPr lang="en-GB" smtClean="0"/>
-              <a:t>24/01/2021</a:t>
+              <a:t>29/01/2021</a:t>
             </a:fld>
             <a:endParaRPr lang="en-GB"/>
           </a:p>
@@ -2569,7 +2570,7 @@
           <a:p>
             <a:fld id="{A6CBF5DC-C104-4B52-94FE-792D1D730C2D}" type="datetimeFigureOut">
               <a:rPr lang="en-GB" smtClean="0"/>
-              <a:t>24/01/2021</a:t>
+              <a:t>29/01/2021</a:t>
             </a:fld>
             <a:endParaRPr lang="en-GB"/>
           </a:p>
@@ -4094,7 +4095,7 @@
                 <a:rPr lang="en-GB" sz="2200" b="1" dirty="0">
                   <a:latin typeface="Consolas" panose="020B0609020204030204" pitchFamily="49" charset="0"/>
                 </a:rPr>
-                <a:t> the target </a:t>
+                <a:t> of the target </a:t>
               </a:r>
               <a:r>
                 <a:rPr lang="en-GB" sz="2200" dirty="0">
@@ -4287,6 +4288,800 @@
     <p:extLst>
       <p:ext uri="{BB962C8B-B14F-4D97-AF65-F5344CB8AC3E}">
         <p14:creationId xmlns:p14="http://schemas.microsoft.com/office/powerpoint/2010/main" val="1932256854"/>
+      </p:ext>
+    </p:extLst>
+  </p:cSld>
+  <p:clrMapOvr>
+    <a:masterClrMapping/>
+  </p:clrMapOvr>
+</p:sld>
+</file>
+
+<file path=ppt/slides/slide3.xml><?xml version="1.0" encoding="utf-8"?>
+<p:sld xmlns:a="http://schemas.openxmlformats.org/drawingml/2006/main" xmlns:r="http://schemas.openxmlformats.org/officeDocument/2006/relationships" xmlns:p="http://schemas.openxmlformats.org/presentationml/2006/main">
+  <p:cSld>
+    <p:spTree>
+      <p:nvGrpSpPr>
+        <p:cNvPr id="1" name=""/>
+        <p:cNvGrpSpPr/>
+        <p:nvPr/>
+      </p:nvGrpSpPr>
+      <p:grpSpPr>
+        <a:xfrm>
+          <a:off x="0" y="0"/>
+          <a:ext cx="0" cy="0"/>
+          <a:chOff x="0" y="0"/>
+          <a:chExt cx="0" cy="0"/>
+        </a:xfrm>
+      </p:grpSpPr>
+      <p:graphicFrame>
+        <p:nvGraphicFramePr>
+          <p:cNvPr id="11" name="Table 12">
+            <a:extLst>
+              <a:ext uri="{FF2B5EF4-FFF2-40B4-BE49-F238E27FC236}">
+                <a16:creationId xmlns:a16="http://schemas.microsoft.com/office/drawing/2014/main" id="{13628C70-FE4D-47A5-BD27-52D701469962}"/>
+              </a:ext>
+            </a:extLst>
+          </p:cNvPr>
+          <p:cNvGraphicFramePr>
+            <a:graphicFrameLocks noGrp="1"/>
+          </p:cNvGraphicFramePr>
+          <p:nvPr>
+            <p:extLst>
+              <p:ext uri="{D42A27DB-BD31-4B8C-83A1-F6EECF244321}">
+                <p14:modId xmlns:p14="http://schemas.microsoft.com/office/powerpoint/2010/main" val="2388784276"/>
+              </p:ext>
+            </p:extLst>
+          </p:nvPr>
+        </p:nvGraphicFramePr>
+        <p:xfrm>
+          <a:off x="112791" y="538224"/>
+          <a:ext cx="14174629" cy="6315291"/>
+        </p:xfrm>
+        <a:graphic>
+          <a:graphicData uri="http://schemas.openxmlformats.org/drawingml/2006/table">
+            <a:tbl>
+              <a:tblPr firstRow="1" bandRow="1" bandCol="1">
+                <a:tableStyleId>{9D7B26C5-4107-4FEC-AEDC-1716B250A1EF}</a:tableStyleId>
+              </a:tblPr>
+              <a:tblGrid>
+                <a:gridCol w="2421429">
+                  <a:extLst>
+                    <a:ext uri="{9D8B030D-6E8A-4147-A177-3AD203B41FA5}">
+                      <a16:colId xmlns:a16="http://schemas.microsoft.com/office/drawing/2014/main" val="209501863"/>
+                    </a:ext>
+                  </a:extLst>
+                </a:gridCol>
+                <a:gridCol w="5924380">
+                  <a:extLst>
+                    <a:ext uri="{9D8B030D-6E8A-4147-A177-3AD203B41FA5}">
+                      <a16:colId xmlns:a16="http://schemas.microsoft.com/office/drawing/2014/main" val="414401290"/>
+                    </a:ext>
+                  </a:extLst>
+                </a:gridCol>
+                <a:gridCol w="5828820">
+                  <a:extLst>
+                    <a:ext uri="{9D8B030D-6E8A-4147-A177-3AD203B41FA5}">
+                      <a16:colId xmlns:a16="http://schemas.microsoft.com/office/drawing/2014/main" val="678043197"/>
+                    </a:ext>
+                  </a:extLst>
+                </a:gridCol>
+              </a:tblGrid>
+              <a:tr h="769232">
+                <a:tc>
+                  <a:txBody>
+                    <a:bodyPr/>
+                    <a:lstStyle/>
+                    <a:p>
+                      <a:endParaRPr lang="en-SG" sz="2400" dirty="0"/>
+                    </a:p>
+                  </a:txBody>
+                  <a:tcPr marL="115653" marR="115653" marT="57826" marB="57826">
+                    <a:lnR w="12700" cap="flat" cmpd="sng" algn="ctr">
+                      <a:noFill/>
+                      <a:prstDash val="solid"/>
+                      <a:round/>
+                      <a:headEnd type="none" w="med" len="med"/>
+                      <a:tailEnd type="none" w="med" len="med"/>
+                    </a:lnR>
+                    <a:lnB w="12700" cap="flat" cmpd="sng" algn="ctr">
+                      <a:solidFill>
+                        <a:schemeClr val="tx1"/>
+                      </a:solidFill>
+                      <a:prstDash val="solid"/>
+                      <a:round/>
+                      <a:headEnd type="none" w="med" len="med"/>
+                      <a:tailEnd type="none" w="med" len="med"/>
+                    </a:lnB>
+                  </a:tcPr>
+                </a:tc>
+                <a:tc>
+                  <a:txBody>
+                    <a:bodyPr/>
+                    <a:lstStyle/>
+                    <a:p>
+                      <a:pPr algn="ctr"/>
+                      <a:r>
+                        <a:rPr lang="en-SG" sz="3000" dirty="0" err="1"/>
+                        <a:t>Delboeuf</a:t>
+                      </a:r>
+                      <a:r>
+                        <a:rPr lang="en-SG" sz="3000" dirty="0"/>
+                        <a:t> Illusion</a:t>
+                      </a:r>
+                      <a:endParaRPr lang="en-SG" sz="3000" b="1" dirty="0"/>
+                    </a:p>
+                  </a:txBody>
+                  <a:tcPr marL="115653" marR="115653" marT="57826" marB="57826">
+                    <a:lnL w="12700" cap="flat" cmpd="sng" algn="ctr">
+                      <a:noFill/>
+                      <a:prstDash val="solid"/>
+                      <a:round/>
+                      <a:headEnd type="none" w="med" len="med"/>
+                      <a:tailEnd type="none" w="med" len="med"/>
+                    </a:lnL>
+                    <a:lnR w="12700" cap="flat" cmpd="sng" algn="ctr">
+                      <a:noFill/>
+                      <a:prstDash val="solid"/>
+                      <a:round/>
+                      <a:headEnd type="none" w="med" len="med"/>
+                      <a:tailEnd type="none" w="med" len="med"/>
+                    </a:lnR>
+                    <a:lnB w="12700" cap="flat" cmpd="sng" algn="ctr">
+                      <a:solidFill>
+                        <a:schemeClr val="tx1"/>
+                      </a:solidFill>
+                      <a:prstDash val="solid"/>
+                      <a:round/>
+                      <a:headEnd type="none" w="med" len="med"/>
+                      <a:tailEnd type="none" w="med" len="med"/>
+                    </a:lnB>
+                  </a:tcPr>
+                </a:tc>
+                <a:tc>
+                  <a:txBody>
+                    <a:bodyPr/>
+                    <a:lstStyle/>
+                    <a:p>
+                      <a:pPr algn="ctr"/>
+                      <a:r>
+                        <a:rPr lang="en-SG" sz="3000" dirty="0" err="1"/>
+                        <a:t>Ponzo</a:t>
+                      </a:r>
+                      <a:r>
+                        <a:rPr lang="en-SG" sz="3000" dirty="0"/>
+                        <a:t> Illusion</a:t>
+                      </a:r>
+                      <a:endParaRPr lang="en-SG" sz="3000" b="1" dirty="0"/>
+                    </a:p>
+                  </a:txBody>
+                  <a:tcPr marL="115653" marR="115653" marT="57826" marB="57826">
+                    <a:lnL w="12700" cap="flat" cmpd="sng" algn="ctr">
+                      <a:noFill/>
+                      <a:prstDash val="solid"/>
+                      <a:round/>
+                      <a:headEnd type="none" w="med" len="med"/>
+                      <a:tailEnd type="none" w="med" len="med"/>
+                    </a:lnL>
+                    <a:lnB w="12700" cap="flat" cmpd="sng" algn="ctr">
+                      <a:solidFill>
+                        <a:schemeClr val="tx1"/>
+                      </a:solidFill>
+                      <a:prstDash val="solid"/>
+                      <a:round/>
+                      <a:headEnd type="none" w="med" len="med"/>
+                      <a:tailEnd type="none" w="med" len="med"/>
+                    </a:lnB>
+                  </a:tcPr>
+                </a:tc>
+                <a:extLst>
+                  <a:ext uri="{0D108BD9-81ED-4DB2-BD59-A6C34878D82A}">
+                    <a16:rowId xmlns:a16="http://schemas.microsoft.com/office/drawing/2014/main" val="1916686305"/>
+                  </a:ext>
+                </a:extLst>
+              </a:tr>
+              <a:tr h="1291395">
+                <a:tc>
+                  <a:txBody>
+                    <a:bodyPr/>
+                    <a:lstStyle/>
+                    <a:p>
+                      <a:r>
+                        <a:rPr lang="en-SG" sz="2400" b="1" dirty="0"/>
+                        <a:t>Illusion strength</a:t>
+                      </a:r>
+                    </a:p>
+                  </a:txBody>
+                  <a:tcPr marL="115653" marR="115653" marT="57826" marB="57826" anchor="ctr">
+                    <a:lnL>
+                      <a:noFill/>
+                    </a:lnL>
+                    <a:lnR w="12700" cap="flat" cmpd="sng" algn="ctr">
+                      <a:noFill/>
+                      <a:prstDash val="solid"/>
+                      <a:round/>
+                      <a:headEnd type="none" w="med" len="med"/>
+                      <a:tailEnd type="none" w="med" len="med"/>
+                    </a:lnR>
+                    <a:lnT w="12700" cap="flat" cmpd="sng" algn="ctr">
+                      <a:solidFill>
+                        <a:schemeClr val="tx1"/>
+                      </a:solidFill>
+                      <a:prstDash val="solid"/>
+                      <a:round/>
+                      <a:headEnd type="none" w="med" len="med"/>
+                      <a:tailEnd type="none" w="med" len="med"/>
+                    </a:lnT>
+                    <a:lnB w="12700" cap="flat" cmpd="sng" algn="ctr">
+                      <a:solidFill>
+                        <a:schemeClr val="tx1"/>
+                      </a:solidFill>
+                      <a:prstDash val="solid"/>
+                      <a:round/>
+                      <a:headEnd type="none" w="med" len="med"/>
+                      <a:tailEnd type="none" w="med" len="med"/>
+                    </a:lnB>
+                    <a:lnTlToBr w="12700" cmpd="sng">
+                      <a:noFill/>
+                      <a:prstDash val="solid"/>
+                    </a:lnTlToBr>
+                    <a:lnBlToTr w="12700" cmpd="sng">
+                      <a:noFill/>
+                      <a:prstDash val="solid"/>
+                    </a:lnBlToTr>
+                    <a:solidFill>
+                      <a:schemeClr val="bg1"/>
+                    </a:solidFill>
+                  </a:tcPr>
+                </a:tc>
+                <a:tc>
+                  <a:txBody>
+                    <a:bodyPr/>
+                    <a:lstStyle/>
+                    <a:p>
+                      <a:r>
+                        <a:rPr lang="en-SG" sz="2400" dirty="0"/>
+                        <a:t>Manipulated by the area of outer circles</a:t>
+                      </a:r>
+                    </a:p>
+                  </a:txBody>
+                  <a:tcPr marL="115653" marR="115653" marT="57826" marB="57826">
+                    <a:lnL w="12700" cap="flat" cmpd="sng" algn="ctr">
+                      <a:noFill/>
+                      <a:prstDash val="solid"/>
+                      <a:round/>
+                      <a:headEnd type="none" w="med" len="med"/>
+                      <a:tailEnd type="none" w="med" len="med"/>
+                    </a:lnL>
+                    <a:lnR w="12700" cap="flat" cmpd="sng" algn="ctr">
+                      <a:noFill/>
+                      <a:prstDash val="solid"/>
+                      <a:round/>
+                      <a:headEnd type="none" w="med" len="med"/>
+                      <a:tailEnd type="none" w="med" len="med"/>
+                    </a:lnR>
+                    <a:lnT w="12700" cap="flat" cmpd="sng" algn="ctr">
+                      <a:solidFill>
+                        <a:schemeClr val="tx1"/>
+                      </a:solidFill>
+                      <a:prstDash val="solid"/>
+                      <a:round/>
+                      <a:headEnd type="none" w="med" len="med"/>
+                      <a:tailEnd type="none" w="med" len="med"/>
+                    </a:lnT>
+                    <a:lnB w="12700" cap="flat" cmpd="sng" algn="ctr">
+                      <a:solidFill>
+                        <a:schemeClr val="tx1"/>
+                      </a:solidFill>
+                      <a:prstDash val="solid"/>
+                      <a:round/>
+                      <a:headEnd type="none" w="med" len="med"/>
+                      <a:tailEnd type="none" w="med" len="med"/>
+                    </a:lnB>
+                    <a:lnTlToBr w="12700" cmpd="sng">
+                      <a:noFill/>
+                      <a:prstDash val="solid"/>
+                    </a:lnTlToBr>
+                    <a:lnBlToTr w="12700" cmpd="sng">
+                      <a:noFill/>
+                      <a:prstDash val="solid"/>
+                    </a:lnBlToTr>
+                    <a:solidFill>
+                      <a:schemeClr val="bg1"/>
+                    </a:solidFill>
+                  </a:tcPr>
+                </a:tc>
+                <a:tc>
+                  <a:txBody>
+                    <a:bodyPr/>
+                    <a:lstStyle/>
+                    <a:p>
+                      <a:r>
+                        <a:rPr lang="en-SG" sz="2400" dirty="0"/>
+                        <a:t>Manipulated by the angle of distractor lines i.e., non-horizontal lines</a:t>
+                      </a:r>
+                    </a:p>
+                  </a:txBody>
+                  <a:tcPr marL="115653" marR="115653" marT="57826" marB="57826">
+                    <a:lnL w="12700" cap="flat" cmpd="sng" algn="ctr">
+                      <a:noFill/>
+                      <a:prstDash val="solid"/>
+                      <a:round/>
+                      <a:headEnd type="none" w="med" len="med"/>
+                      <a:tailEnd type="none" w="med" len="med"/>
+                    </a:lnL>
+                    <a:lnR>
+                      <a:noFill/>
+                    </a:lnR>
+                    <a:lnT w="12700" cap="flat" cmpd="sng" algn="ctr">
+                      <a:solidFill>
+                        <a:schemeClr val="tx1"/>
+                      </a:solidFill>
+                      <a:prstDash val="solid"/>
+                      <a:round/>
+                      <a:headEnd type="none" w="med" len="med"/>
+                      <a:tailEnd type="none" w="med" len="med"/>
+                    </a:lnT>
+                    <a:lnB w="12700" cap="flat" cmpd="sng" algn="ctr">
+                      <a:solidFill>
+                        <a:schemeClr val="tx1"/>
+                      </a:solidFill>
+                      <a:prstDash val="solid"/>
+                      <a:round/>
+                      <a:headEnd type="none" w="med" len="med"/>
+                      <a:tailEnd type="none" w="med" len="med"/>
+                    </a:lnB>
+                    <a:lnTlToBr w="12700" cmpd="sng">
+                      <a:noFill/>
+                      <a:prstDash val="solid"/>
+                    </a:lnTlToBr>
+                    <a:lnBlToTr w="12700" cmpd="sng">
+                      <a:noFill/>
+                      <a:prstDash val="solid"/>
+                    </a:lnBlToTr>
+                    <a:solidFill>
+                      <a:schemeClr val="bg1"/>
+                    </a:solidFill>
+                  </a:tcPr>
+                </a:tc>
+                <a:extLst>
+                  <a:ext uri="{0D108BD9-81ED-4DB2-BD59-A6C34878D82A}">
+                    <a16:rowId xmlns:a16="http://schemas.microsoft.com/office/drawing/2014/main" val="3314591089"/>
+                  </a:ext>
+                </a:extLst>
+              </a:tr>
+              <a:tr h="1572879">
+                <a:tc>
+                  <a:txBody>
+                    <a:bodyPr/>
+                    <a:lstStyle/>
+                    <a:p>
+                      <a:r>
+                        <a:rPr lang="en-SG" sz="2400" b="1" dirty="0"/>
+                        <a:t>Achieved biased perception </a:t>
+                      </a:r>
+                    </a:p>
+                  </a:txBody>
+                  <a:tcPr marL="115653" marR="115653" marT="57826" marB="57826" anchor="ctr">
+                    <a:lnL>
+                      <a:noFill/>
+                    </a:lnL>
+                    <a:lnR w="12700" cap="flat" cmpd="sng" algn="ctr">
+                      <a:noFill/>
+                      <a:prstDash val="solid"/>
+                      <a:round/>
+                      <a:headEnd type="none" w="med" len="med"/>
+                      <a:tailEnd type="none" w="med" len="med"/>
+                    </a:lnR>
+                    <a:lnT w="12700" cap="flat" cmpd="sng" algn="ctr">
+                      <a:solidFill>
+                        <a:schemeClr val="tx1"/>
+                      </a:solidFill>
+                      <a:prstDash val="solid"/>
+                      <a:round/>
+                      <a:headEnd type="none" w="med" len="med"/>
+                      <a:tailEnd type="none" w="med" len="med"/>
+                    </a:lnT>
+                    <a:lnB w="12700" cap="flat" cmpd="sng" algn="ctr">
+                      <a:solidFill>
+                        <a:schemeClr val="tx1"/>
+                      </a:solidFill>
+                      <a:prstDash val="solid"/>
+                      <a:round/>
+                      <a:headEnd type="none" w="med" len="med"/>
+                      <a:tailEnd type="none" w="med" len="med"/>
+                    </a:lnB>
+                    <a:lnTlToBr w="12700" cmpd="sng">
+                      <a:noFill/>
+                      <a:prstDash val="solid"/>
+                    </a:lnTlToBr>
+                    <a:lnBlToTr w="12700" cmpd="sng">
+                      <a:noFill/>
+                      <a:prstDash val="solid"/>
+                    </a:lnBlToTr>
+                    <a:solidFill>
+                      <a:schemeClr val="bg1"/>
+                    </a:solidFill>
+                  </a:tcPr>
+                </a:tc>
+                <a:tc>
+                  <a:txBody>
+                    <a:bodyPr/>
+                    <a:lstStyle/>
+                    <a:p>
+                      <a:r>
+                        <a:rPr lang="en-SG" sz="2400" dirty="0"/>
+                        <a:t>The inner circle that has a smaller surrounding outer circle looks bigger than the inner circle that has a larger surrounding circle</a:t>
+                      </a:r>
+                    </a:p>
+                  </a:txBody>
+                  <a:tcPr marL="115653" marR="115653" marT="57826" marB="57826">
+                    <a:lnL w="12700" cap="flat" cmpd="sng" algn="ctr">
+                      <a:noFill/>
+                      <a:prstDash val="solid"/>
+                      <a:round/>
+                      <a:headEnd type="none" w="med" len="med"/>
+                      <a:tailEnd type="none" w="med" len="med"/>
+                    </a:lnL>
+                    <a:lnR w="12700" cap="flat" cmpd="sng" algn="ctr">
+                      <a:noFill/>
+                      <a:prstDash val="solid"/>
+                      <a:round/>
+                      <a:headEnd type="none" w="med" len="med"/>
+                      <a:tailEnd type="none" w="med" len="med"/>
+                    </a:lnR>
+                    <a:lnT w="12700" cap="flat" cmpd="sng" algn="ctr">
+                      <a:solidFill>
+                        <a:schemeClr val="tx1"/>
+                      </a:solidFill>
+                      <a:prstDash val="solid"/>
+                      <a:round/>
+                      <a:headEnd type="none" w="med" len="med"/>
+                      <a:tailEnd type="none" w="med" len="med"/>
+                    </a:lnT>
+                    <a:lnB w="12700" cap="flat" cmpd="sng" algn="ctr">
+                      <a:solidFill>
+                        <a:schemeClr val="tx1"/>
+                      </a:solidFill>
+                      <a:prstDash val="solid"/>
+                      <a:round/>
+                      <a:headEnd type="none" w="med" len="med"/>
+                      <a:tailEnd type="none" w="med" len="med"/>
+                    </a:lnB>
+                    <a:lnTlToBr w="12700" cmpd="sng">
+                      <a:noFill/>
+                      <a:prstDash val="solid"/>
+                    </a:lnTlToBr>
+                    <a:lnBlToTr w="12700" cmpd="sng">
+                      <a:noFill/>
+                      <a:prstDash val="solid"/>
+                    </a:lnBlToTr>
+                    <a:solidFill>
+                      <a:schemeClr val="bg1"/>
+                    </a:solidFill>
+                  </a:tcPr>
+                </a:tc>
+                <a:tc>
+                  <a:txBody>
+                    <a:bodyPr/>
+                    <a:lstStyle/>
+                    <a:p>
+                      <a:r>
+                        <a:rPr lang="en-SG" sz="2400" dirty="0"/>
+                        <a:t>The upper horizontal line looks longer than the bottom horizontal line as it appears to be “in the background”</a:t>
+                      </a:r>
+                    </a:p>
+                  </a:txBody>
+                  <a:tcPr marL="115653" marR="115653" marT="57826" marB="57826">
+                    <a:lnL w="12700" cap="flat" cmpd="sng" algn="ctr">
+                      <a:noFill/>
+                      <a:prstDash val="solid"/>
+                      <a:round/>
+                      <a:headEnd type="none" w="med" len="med"/>
+                      <a:tailEnd type="none" w="med" len="med"/>
+                    </a:lnL>
+                    <a:lnR>
+                      <a:noFill/>
+                    </a:lnR>
+                    <a:lnT w="12700" cap="flat" cmpd="sng" algn="ctr">
+                      <a:solidFill>
+                        <a:schemeClr val="tx1"/>
+                      </a:solidFill>
+                      <a:prstDash val="solid"/>
+                      <a:round/>
+                      <a:headEnd type="none" w="med" len="med"/>
+                      <a:tailEnd type="none" w="med" len="med"/>
+                    </a:lnT>
+                    <a:lnB w="12700" cap="flat" cmpd="sng" algn="ctr">
+                      <a:solidFill>
+                        <a:schemeClr val="tx1"/>
+                      </a:solidFill>
+                      <a:prstDash val="solid"/>
+                      <a:round/>
+                      <a:headEnd type="none" w="med" len="med"/>
+                      <a:tailEnd type="none" w="med" len="med"/>
+                    </a:lnB>
+                    <a:lnTlToBr w="12700" cmpd="sng">
+                      <a:noFill/>
+                      <a:prstDash val="solid"/>
+                    </a:lnTlToBr>
+                    <a:lnBlToTr w="12700" cmpd="sng">
+                      <a:noFill/>
+                      <a:prstDash val="solid"/>
+                    </a:lnBlToTr>
+                    <a:solidFill>
+                      <a:schemeClr val="bg1"/>
+                    </a:solidFill>
+                  </a:tcPr>
+                </a:tc>
+                <a:extLst>
+                  <a:ext uri="{0D108BD9-81ED-4DB2-BD59-A6C34878D82A}">
+                    <a16:rowId xmlns:a16="http://schemas.microsoft.com/office/drawing/2014/main" val="1209539089"/>
+                  </a:ext>
+                </a:extLst>
+              </a:tr>
+              <a:tr h="2665798">
+                <a:tc>
+                  <a:txBody>
+                    <a:bodyPr/>
+                    <a:lstStyle/>
+                    <a:p>
+                      <a:endParaRPr lang="en-SG" sz="2400" b="1" dirty="0"/>
+                    </a:p>
+                    <a:p>
+                      <a:endParaRPr lang="en-SG" sz="2400" b="1" dirty="0"/>
+                    </a:p>
+                    <a:p>
+                      <a:endParaRPr lang="en-SG" sz="2400" b="1" dirty="0"/>
+                    </a:p>
+                    <a:p>
+                      <a:r>
+                        <a:rPr lang="en-SG" sz="2400" b="1" dirty="0"/>
+                        <a:t>Output</a:t>
+                      </a:r>
+                    </a:p>
+                    <a:p>
+                      <a:endParaRPr lang="en-SG" sz="2400" b="1" dirty="0"/>
+                    </a:p>
+                    <a:p>
+                      <a:endParaRPr lang="en-SG" sz="2400" b="1" dirty="0"/>
+                    </a:p>
+                    <a:p>
+                      <a:endParaRPr lang="en-SG" sz="2400" b="1" dirty="0"/>
+                    </a:p>
+                  </a:txBody>
+                  <a:tcPr marL="115653" marR="115653" marT="57826" marB="57826" anchor="ctr">
+                    <a:lnL>
+                      <a:noFill/>
+                    </a:lnL>
+                    <a:lnR w="12700" cap="flat" cmpd="sng" algn="ctr">
+                      <a:noFill/>
+                      <a:prstDash val="solid"/>
+                      <a:round/>
+                      <a:headEnd type="none" w="med" len="med"/>
+                      <a:tailEnd type="none" w="med" len="med"/>
+                    </a:lnR>
+                    <a:lnT w="12700" cap="flat" cmpd="sng" algn="ctr">
+                      <a:solidFill>
+                        <a:schemeClr val="tx1"/>
+                      </a:solidFill>
+                      <a:prstDash val="solid"/>
+                      <a:round/>
+                      <a:headEnd type="none" w="med" len="med"/>
+                      <a:tailEnd type="none" w="med" len="med"/>
+                    </a:lnT>
+                    <a:lnB w="12700" cap="flat" cmpd="sng" algn="ctr">
+                      <a:solidFill>
+                        <a:schemeClr val="tx1"/>
+                      </a:solidFill>
+                      <a:prstDash val="solid"/>
+                      <a:round/>
+                      <a:headEnd type="none" w="med" len="med"/>
+                      <a:tailEnd type="none" w="med" len="med"/>
+                    </a:lnB>
+                    <a:lnTlToBr w="12700" cmpd="sng">
+                      <a:noFill/>
+                      <a:prstDash val="solid"/>
+                    </a:lnTlToBr>
+                    <a:lnBlToTr w="12700" cmpd="sng">
+                      <a:noFill/>
+                      <a:prstDash val="solid"/>
+                    </a:lnBlToTr>
+                    <a:solidFill>
+                      <a:schemeClr val="bg1"/>
+                    </a:solidFill>
+                  </a:tcPr>
+                </a:tc>
+                <a:tc>
+                  <a:txBody>
+                    <a:bodyPr/>
+                    <a:lstStyle/>
+                    <a:p>
+                      <a:endParaRPr lang="en-SG" sz="2400" dirty="0"/>
+                    </a:p>
+                  </a:txBody>
+                  <a:tcPr marL="115653" marR="115653" marT="57826" marB="57826">
+                    <a:lnL w="12700" cap="flat" cmpd="sng" algn="ctr">
+                      <a:noFill/>
+                      <a:prstDash val="solid"/>
+                      <a:round/>
+                      <a:headEnd type="none" w="med" len="med"/>
+                      <a:tailEnd type="none" w="med" len="med"/>
+                    </a:lnL>
+                    <a:lnR w="12700" cap="flat" cmpd="sng" algn="ctr">
+                      <a:noFill/>
+                      <a:prstDash val="solid"/>
+                      <a:round/>
+                      <a:headEnd type="none" w="med" len="med"/>
+                      <a:tailEnd type="none" w="med" len="med"/>
+                    </a:lnR>
+                    <a:lnT w="12700" cap="flat" cmpd="sng" algn="ctr">
+                      <a:solidFill>
+                        <a:schemeClr val="tx1"/>
+                      </a:solidFill>
+                      <a:prstDash val="solid"/>
+                      <a:round/>
+                      <a:headEnd type="none" w="med" len="med"/>
+                      <a:tailEnd type="none" w="med" len="med"/>
+                    </a:lnT>
+                    <a:lnB w="12700" cap="flat" cmpd="sng" algn="ctr">
+                      <a:solidFill>
+                        <a:schemeClr val="tx1"/>
+                      </a:solidFill>
+                      <a:prstDash val="solid"/>
+                      <a:round/>
+                      <a:headEnd type="none" w="med" len="med"/>
+                      <a:tailEnd type="none" w="med" len="med"/>
+                    </a:lnB>
+                    <a:lnTlToBr w="12700" cmpd="sng">
+                      <a:noFill/>
+                      <a:prstDash val="solid"/>
+                    </a:lnTlToBr>
+                    <a:lnBlToTr w="12700" cmpd="sng">
+                      <a:noFill/>
+                      <a:prstDash val="solid"/>
+                    </a:lnBlToTr>
+                    <a:solidFill>
+                      <a:schemeClr val="bg1"/>
+                    </a:solidFill>
+                  </a:tcPr>
+                </a:tc>
+                <a:tc>
+                  <a:txBody>
+                    <a:bodyPr/>
+                    <a:lstStyle/>
+                    <a:p>
+                      <a:endParaRPr lang="en-SG" sz="2400" dirty="0"/>
+                    </a:p>
+                  </a:txBody>
+                  <a:tcPr marL="115653" marR="115653" marT="57826" marB="57826">
+                    <a:lnL w="12700" cap="flat" cmpd="sng" algn="ctr">
+                      <a:noFill/>
+                      <a:prstDash val="solid"/>
+                      <a:round/>
+                      <a:headEnd type="none" w="med" len="med"/>
+                      <a:tailEnd type="none" w="med" len="med"/>
+                    </a:lnL>
+                    <a:lnR>
+                      <a:noFill/>
+                    </a:lnR>
+                    <a:lnT w="12700" cap="flat" cmpd="sng" algn="ctr">
+                      <a:solidFill>
+                        <a:schemeClr val="tx1"/>
+                      </a:solidFill>
+                      <a:prstDash val="solid"/>
+                      <a:round/>
+                      <a:headEnd type="none" w="med" len="med"/>
+                      <a:tailEnd type="none" w="med" len="med"/>
+                    </a:lnT>
+                    <a:lnB w="12700" cap="flat" cmpd="sng" algn="ctr">
+                      <a:solidFill>
+                        <a:schemeClr val="tx1"/>
+                      </a:solidFill>
+                      <a:prstDash val="solid"/>
+                      <a:round/>
+                      <a:headEnd type="none" w="med" len="med"/>
+                      <a:tailEnd type="none" w="med" len="med"/>
+                    </a:lnB>
+                    <a:lnTlToBr w="12700" cmpd="sng">
+                      <a:noFill/>
+                      <a:prstDash val="solid"/>
+                    </a:lnTlToBr>
+                    <a:lnBlToTr w="12700" cmpd="sng">
+                      <a:noFill/>
+                      <a:prstDash val="solid"/>
+                    </a:lnBlToTr>
+                    <a:solidFill>
+                      <a:schemeClr val="bg1"/>
+                    </a:solidFill>
+                  </a:tcPr>
+                </a:tc>
+                <a:extLst>
+                  <a:ext uri="{0D108BD9-81ED-4DB2-BD59-A6C34878D82A}">
+                    <a16:rowId xmlns:a16="http://schemas.microsoft.com/office/drawing/2014/main" val="619364209"/>
+                  </a:ext>
+                </a:extLst>
+              </a:tr>
+            </a:tbl>
+          </a:graphicData>
+        </a:graphic>
+      </p:graphicFrame>
+      <p:pic>
+        <p:nvPicPr>
+          <p:cNvPr id="7" name="Picture 6" descr="A picture containing shape&#10;&#10;Description automatically generated">
+            <a:extLst>
+              <a:ext uri="{FF2B5EF4-FFF2-40B4-BE49-F238E27FC236}">
+                <a16:creationId xmlns:a16="http://schemas.microsoft.com/office/drawing/2014/main" id="{F4A246ED-40FE-445B-AF8E-31B495977EED}"/>
+              </a:ext>
+            </a:extLst>
+          </p:cNvPr>
+          <p:cNvPicPr>
+            <a:picLocks noChangeAspect="1"/>
+          </p:cNvPicPr>
+          <p:nvPr/>
+        </p:nvPicPr>
+        <p:blipFill>
+          <a:blip r:embed="rId2">
+            <a:extLst>
+              <a:ext uri="{28A0092B-C50C-407E-A947-70E740481C1C}">
+                <a14:useLocalDpi xmlns:a14="http://schemas.microsoft.com/office/drawing/2010/main" val="0"/>
+              </a:ext>
+            </a:extLst>
+          </a:blip>
+          <a:stretch>
+            <a:fillRect/>
+          </a:stretch>
+        </p:blipFill>
+        <p:spPr>
+          <a:xfrm>
+            <a:off x="3707960" y="4230656"/>
+            <a:ext cx="3325653" cy="2494240"/>
+          </a:xfrm>
+          <a:prstGeom prst="rect">
+            <a:avLst/>
+          </a:prstGeom>
+        </p:spPr>
+      </p:pic>
+      <p:pic>
+        <p:nvPicPr>
+          <p:cNvPr id="9" name="Picture 8" descr="A picture containing line chart&#10;&#10;Description automatically generated">
+            <a:extLst>
+              <a:ext uri="{FF2B5EF4-FFF2-40B4-BE49-F238E27FC236}">
+                <a16:creationId xmlns:a16="http://schemas.microsoft.com/office/drawing/2014/main" id="{4C8AEA2C-5B3F-4F95-AE30-64BE01E435ED}"/>
+              </a:ext>
+            </a:extLst>
+          </p:cNvPr>
+          <p:cNvPicPr>
+            <a:picLocks noChangeAspect="1"/>
+          </p:cNvPicPr>
+          <p:nvPr/>
+        </p:nvPicPr>
+        <p:blipFill>
+          <a:blip r:embed="rId3">
+            <a:extLst>
+              <a:ext uri="{28A0092B-C50C-407E-A947-70E740481C1C}">
+                <a14:useLocalDpi xmlns:a14="http://schemas.microsoft.com/office/drawing/2010/main" val="0"/>
+              </a:ext>
+            </a:extLst>
+          </a:blip>
+          <a:stretch>
+            <a:fillRect/>
+          </a:stretch>
+        </p:blipFill>
+        <p:spPr>
+          <a:xfrm>
+            <a:off x="9966941" y="4230656"/>
+            <a:ext cx="3325653" cy="2494240"/>
+          </a:xfrm>
+          <a:prstGeom prst="rect">
+            <a:avLst/>
+          </a:prstGeom>
+        </p:spPr>
+      </p:pic>
+    </p:spTree>
+    <p:extLst>
+      <p:ext uri="{BB962C8B-B14F-4D97-AF65-F5344CB8AC3E}">
+        <p14:creationId xmlns:p14="http://schemas.microsoft.com/office/powerpoint/2010/main" val="3528083374"/>
       </p:ext>
     </p:extLst>
   </p:cSld>

</xml_diff>